<commit_message>
Add Node.js Performance (Final)
</commit_message>
<xml_diff>
--- a/BossLocker_김홍일_양태윤_조소연.pptx
+++ b/BossLocker_김홍일_양태윤_조소연.pptx
@@ -7173,7 +7173,7 @@
                   <a:srgbClr val="59606B"/>
                 </a:solidFill>
               </a:rPr>
-              <a:t>디지털오션 클라우드 서비스를 이용한 서버 생성</a:t>
+              <a:t>디지털오션 클라우드 서비스를 이용한 서버 </a:t>
             </a:r>
             <a:endParaRPr kumimoji="1" lang="en-US" altLang="ko-KR" b="1" dirty="0" smtClean="0">
               <a:solidFill>
@@ -7380,6 +7380,67 @@
           </a:p>
         </p:txBody>
       </p:sp>
+      <p:pic>
+        <p:nvPicPr>
+          <p:cNvPr id="2" name="그림 1"/>
+          <p:cNvPicPr>
+            <a:picLocks noChangeAspect="1"/>
+          </p:cNvPicPr>
+          <p:nvPr/>
+        </p:nvPicPr>
+        <p:blipFill>
+          <a:blip r:embed="rId5">
+            <a:extLst>
+              <a:ext uri="{28A0092B-C50C-407E-A947-70E740481C1C}">
+                <a14:useLocalDpi xmlns:a14="http://schemas.microsoft.com/office/drawing/2010/main" val="0"/>
+              </a:ext>
+            </a:extLst>
+          </a:blip>
+          <a:stretch>
+            <a:fillRect/>
+          </a:stretch>
+        </p:blipFill>
+        <p:spPr>
+          <a:xfrm>
+            <a:off x="2438400" y="2247294"/>
+            <a:ext cx="8193413" cy="2990884"/>
+          </a:xfrm>
+          <a:prstGeom prst="rect">
+            <a:avLst/>
+          </a:prstGeom>
+          <a:ln w="31750">
+            <a:solidFill>
+              <a:srgbClr val="509D93"/>
+            </a:solidFill>
+          </a:ln>
+        </p:spPr>
+      </p:pic>
+      <p:sp>
+        <p:nvSpPr>
+          <p:cNvPr id="4" name="텍스트 상자 3"/>
+          <p:cNvSpPr txBox="1"/>
+          <p:nvPr/>
+        </p:nvSpPr>
+        <p:spPr>
+          <a:xfrm>
+            <a:off x="-3721994" y="-1545465"/>
+            <a:ext cx="184731" cy="369332"/>
+          </a:xfrm>
+          <a:prstGeom prst="rect">
+            <a:avLst/>
+          </a:prstGeom>
+          <a:noFill/>
+        </p:spPr>
+        <p:txBody>
+          <a:bodyPr wrap="none" rtlCol="0">
+            <a:spAutoFit/>
+          </a:bodyPr>
+          <a:lstStyle/>
+          <a:p>
+            <a:endParaRPr kumimoji="1" lang="ko-KR" altLang="en-US" dirty="0"/>
+          </a:p>
+        </p:txBody>
+      </p:sp>
     </p:spTree>
     <p:extLst>
       <p:ext uri="{BB962C8B-B14F-4D97-AF65-F5344CB8AC3E}">
@@ -7396,7 +7457,75 @@
   <p:timing>
     <p:tnLst>
       <p:par>
-        <p:cTn id="1" dur="indefinite" restart="never" nodeType="tmRoot"/>
+        <p:cTn id="1" dur="indefinite" restart="never" nodeType="tmRoot">
+          <p:childTnLst>
+            <p:seq concurrent="1" nextAc="seek">
+              <p:cTn id="2" dur="indefinite" nodeType="mainSeq">
+                <p:childTnLst>
+                  <p:par>
+                    <p:cTn id="3" fill="hold">
+                      <p:stCondLst>
+                        <p:cond delay="indefinite"/>
+                      </p:stCondLst>
+                      <p:childTnLst>
+                        <p:par>
+                          <p:cTn id="4" fill="hold">
+                            <p:stCondLst>
+                              <p:cond delay="0"/>
+                            </p:stCondLst>
+                            <p:childTnLst>
+                              <p:par>
+                                <p:cTn id="5" presetID="1" presetClass="entr" presetSubtype="0" fill="hold" nodeType="clickEffect">
+                                  <p:stCondLst>
+                                    <p:cond delay="0"/>
+                                  </p:stCondLst>
+                                  <p:childTnLst>
+                                    <p:set>
+                                      <p:cBhvr>
+                                        <p:cTn id="6" dur="1" fill="hold">
+                                          <p:stCondLst>
+                                            <p:cond delay="0"/>
+                                          </p:stCondLst>
+                                        </p:cTn>
+                                        <p:tgtEl>
+                                          <p:spTgt spid="2"/>
+                                        </p:tgtEl>
+                                        <p:attrNameLst>
+                                          <p:attrName>style.visibility</p:attrName>
+                                        </p:attrNameLst>
+                                      </p:cBhvr>
+                                      <p:to>
+                                        <p:strVal val="visible"/>
+                                      </p:to>
+                                    </p:set>
+                                  </p:childTnLst>
+                                </p:cTn>
+                              </p:par>
+                            </p:childTnLst>
+                          </p:cTn>
+                        </p:par>
+                      </p:childTnLst>
+                    </p:cTn>
+                  </p:par>
+                </p:childTnLst>
+              </p:cTn>
+              <p:prevCondLst>
+                <p:cond evt="onPrev" delay="0">
+                  <p:tgtEl>
+                    <p:sldTgt/>
+                  </p:tgtEl>
+                </p:cond>
+              </p:prevCondLst>
+              <p:nextCondLst>
+                <p:cond evt="onNext" delay="0">
+                  <p:tgtEl>
+                    <p:sldTgt/>
+                  </p:tgtEl>
+                </p:cond>
+              </p:nextCondLst>
+            </p:seq>
+          </p:childTnLst>
+        </p:cTn>
       </p:par>
     </p:tnLst>
   </p:timing>
@@ -18252,7 +18381,7 @@
           <p:cNvPr id="19" name="TextBox 18">
             <a:extLst>
               <a:ext uri="{FF2B5EF4-FFF2-40B4-BE49-F238E27FC236}">
-                <a16:creationId xmlns:a16="http://schemas.microsoft.com/office/drawing/2014/main" xmlns="" id="{69882930-BFC0-4DAF-854C-CA9A55A4DE7D}"/>
+                <a16:creationId xmlns="" xmlns:a16="http://schemas.microsoft.com/office/drawing/2014/main" id="{69882930-BFC0-4DAF-854C-CA9A55A4DE7D}"/>
               </a:ext>
             </a:extLst>
           </p:cNvPr>
@@ -18296,7 +18425,7 @@
           <p:cNvPr id="20" name="TextBox 19">
             <a:extLst>
               <a:ext uri="{FF2B5EF4-FFF2-40B4-BE49-F238E27FC236}">
-                <a16:creationId xmlns:a16="http://schemas.microsoft.com/office/drawing/2014/main" xmlns="" id="{CFE0347B-6C4D-4E97-BF2E-76FDFF1C8635}"/>
+                <a16:creationId xmlns="" xmlns:a16="http://schemas.microsoft.com/office/drawing/2014/main" id="{CFE0347B-6C4D-4E97-BF2E-76FDFF1C8635}"/>
               </a:ext>
             </a:extLst>
           </p:cNvPr>
@@ -18344,7 +18473,7 @@
           <p:cNvPr id="21" name="TextBox 13">
             <a:extLst>
               <a:ext uri="{FF2B5EF4-FFF2-40B4-BE49-F238E27FC236}">
-                <a16:creationId xmlns:a16="http://schemas.microsoft.com/office/drawing/2014/main" xmlns="" id="{E56ED49B-24D1-495B-8D57-F91216155341}"/>
+                <a16:creationId xmlns="" xmlns:a16="http://schemas.microsoft.com/office/drawing/2014/main" id="{E56ED49B-24D1-495B-8D57-F91216155341}"/>
               </a:ext>
             </a:extLst>
           </p:cNvPr>
@@ -27077,16 +27206,7 @@
                 </a:solidFill>
                 <a:latin typeface="+mj-ea"/>
               </a:rPr>
-              <a:t>인의 </a:t>
-            </a:r>
-            <a:r>
-              <a:rPr lang="ko-KR" altLang="en-US" sz="1600" b="1" dirty="0" smtClean="0">
-                <a:solidFill>
-                  <a:srgbClr val="509D93"/>
-                </a:solidFill>
-                <a:latin typeface="+mj-ea"/>
-              </a:rPr>
-              <a:t>플레이어가</a:t>
+              <a:t>인의 플레이어가</a:t>
             </a:r>
             <a:r>
               <a:rPr lang="en-US" altLang="ko-KR" sz="1600" b="1" dirty="0" smtClean="0">
@@ -27181,16 +27301,7 @@
                 </a:solidFill>
                 <a:latin typeface="+mj-ea"/>
               </a:rPr>
-              <a:t>키보드를 이용해 적의 공격을 </a:t>
-            </a:r>
-            <a:r>
-              <a:rPr lang="ko-KR" altLang="en-US" sz="1600" b="1" dirty="0" smtClean="0">
-                <a:solidFill>
-                  <a:srgbClr val="509D93"/>
-                </a:solidFill>
-                <a:latin typeface="+mj-ea"/>
-              </a:rPr>
-              <a:t>피하고</a:t>
+              <a:t>키보드를 이용해 적의 공격을 피하고</a:t>
             </a:r>
             <a:endParaRPr lang="en-US" altLang="ko-KR" sz="1600" b="1" dirty="0" smtClean="0">
               <a:solidFill>
@@ -27233,16 +27344,7 @@
                 </a:solidFill>
                 <a:latin typeface="+mj-ea"/>
               </a:rPr>
-              <a:t>을 </a:t>
-            </a:r>
-            <a:r>
-              <a:rPr lang="ko-KR" altLang="en-US" sz="1600" b="1" dirty="0" smtClean="0">
-                <a:solidFill>
-                  <a:srgbClr val="509D93"/>
-                </a:solidFill>
-                <a:latin typeface="+mj-ea"/>
-              </a:rPr>
-              <a:t>획득하면서</a:t>
+              <a:t>을 획득하면서</a:t>
             </a:r>
             <a:endParaRPr lang="en-US" altLang="ko-KR" sz="1600" b="1" dirty="0" smtClean="0">
               <a:solidFill>
@@ -27828,16 +27930,7 @@
                 </a:solidFill>
                 <a:latin typeface="+mj-ea"/>
               </a:rPr>
-              <a:t>대기방 </a:t>
-            </a:r>
-            <a:r>
-              <a:rPr lang="ko-KR" altLang="en-US" sz="1050" b="1" dirty="0" smtClean="0">
-                <a:solidFill>
-                  <a:srgbClr val="59606B"/>
-                </a:solidFill>
-                <a:latin typeface="+mj-ea"/>
-              </a:rPr>
-              <a:t>예시</a:t>
+              <a:t>대기방 예시</a:t>
             </a:r>
             <a:r>
               <a:rPr lang="en-US" altLang="ko-KR" sz="1050" b="1" dirty="0" smtClean="0">

</xml_diff>